<commit_message>
Update Holiday homes in the Big City.pptx
</commit_message>
<xml_diff>
--- a/Holiday homes in the Big City.pptx
+++ b/Holiday homes in the Big City.pptx
@@ -8,6 +8,7 @@
     <p:sldId id="256" r:id="rId2"/>
     <p:sldId id="257" r:id="rId3"/>
     <p:sldId id="258" r:id="rId4"/>
+    <p:sldId id="259" r:id="rId5"/>
   </p:sldIdLst>
   <p:sldSz cx="12192000" cy="6858000"/>
   <p:notesSz cx="6858000" cy="9144000"/>
@@ -106,6 +107,11 @@
       </a:defRPr>
     </a:lvl9pPr>
   </p:defaultTextStyle>
+  <p:extLst>
+    <p:ext uri="{EFAFB233-063F-42B5-8137-9DF3F51BA10A}">
+      <p15:sldGuideLst xmlns:p15="http://schemas.microsoft.com/office/powerpoint/2012/main"/>
+    </p:ext>
+  </p:extLst>
 </p:presentation>
 </file>
 
@@ -6893,15 +6899,7 @@
           <a:p>
             <a:r>
               <a:rPr lang="en-US" dirty="0"/>
-              <a:t>New York City, one of the top but expensive tourist destinations has </a:t>
-            </a:r>
-            <a:r>
-              <a:rPr lang="en-US"/>
-              <a:t>a significantly high </a:t>
-            </a:r>
-            <a:r>
-              <a:rPr lang="en-US" dirty="0"/>
-              <a:t>count of Airbnb listing</a:t>
+              <a:t>New York City, one of the top but expensive tourist destinations has a significantly high count of Airbnb listing</a:t>
             </a:r>
             <a:endParaRPr lang="en-GB" dirty="0"/>
           </a:p>
@@ -6952,6 +6950,309 @@
   </p:cSld>
   <p:clrMapOvr>
     <a:overrideClrMapping bg1="lt1" tx1="dk1" bg2="lt2" tx2="dk2" accent1="accent1" accent2="accent2" accent3="accent3" accent4="accent4" accent5="accent5" accent6="accent6" hlink="hlink" folHlink="folHlink"/>
+  </p:clrMapOvr>
+</p:sld>
+</file>
+
+<file path=ppt/slides/slide4.xml><?xml version="1.0" encoding="utf-8"?>
+<p:sld xmlns:a="http://schemas.openxmlformats.org/drawingml/2006/main" xmlns:r="http://schemas.openxmlformats.org/officeDocument/2006/relationships" xmlns:p="http://schemas.openxmlformats.org/presentationml/2006/main">
+  <p:cSld>
+    <p:bg>
+      <p:bgPr>
+        <a:blipFill rotWithShape="1">
+          <a:blip r:embed="rId2">
+            <a:duotone>
+              <a:schemeClr val="bg1">
+                <a:shade val="80000"/>
+                <a:lumMod val="80000"/>
+              </a:schemeClr>
+              <a:schemeClr val="bg1">
+                <a:tint val="98000"/>
+              </a:schemeClr>
+            </a:duotone>
+          </a:blip>
+          <a:stretch/>
+        </a:blipFill>
+        <a:effectLst/>
+      </p:bgPr>
+    </p:bg>
+    <p:spTree>
+      <p:nvGrpSpPr>
+        <p:cNvPr id="1" name=""/>
+        <p:cNvGrpSpPr/>
+        <p:nvPr/>
+      </p:nvGrpSpPr>
+      <p:grpSpPr>
+        <a:xfrm>
+          <a:off x="0" y="0"/>
+          <a:ext cx="0" cy="0"/>
+          <a:chOff x="0" y="0"/>
+          <a:chExt cx="0" cy="0"/>
+        </a:xfrm>
+      </p:grpSpPr>
+      <p:sp useBgFill="1">
+        <p:nvSpPr>
+          <p:cNvPr id="17" name="Rectangle 16">
+            <a:extLst>
+              <a:ext uri="{FF2B5EF4-FFF2-40B4-BE49-F238E27FC236}">
+                <a16:creationId xmlns:a16="http://schemas.microsoft.com/office/drawing/2014/main" id="{1B3897FC-A693-4656-8FCD-CF609C3BDF8D}"/>
+              </a:ext>
+              <a:ext uri="{C183D7F6-B498-43B3-948B-1728B52AA6E4}">
+                <adec:decorative xmlns:adec="http://schemas.microsoft.com/office/drawing/2017/decorative" val="1"/>
+              </a:ext>
+            </a:extLst>
+          </p:cNvPr>
+          <p:cNvSpPr>
+            <a:spLocks noGrp="1" noRot="1" noChangeAspect="1" noMove="1" noResize="1" noEditPoints="1" noAdjustHandles="1" noChangeArrowheads="1" noChangeShapeType="1" noTextEdit="1"/>
+          </p:cNvSpPr>
+          <p:nvPr>
+            <p:extLst>
+              <p:ext uri="{386F3935-93C4-4BCD-93E2-E3B085C9AB24}">
+                <p16:designElem xmlns:p16="http://schemas.microsoft.com/office/powerpoint/2015/main" val="1"/>
+              </p:ext>
+            </p:extLst>
+          </p:nvPr>
+        </p:nvSpPr>
+        <p:spPr>
+          <a:xfrm>
+            <a:off x="0" y="0"/>
+            <a:ext cx="12192000" cy="6858000"/>
+          </a:xfrm>
+          <a:prstGeom prst="rect">
+            <a:avLst/>
+          </a:prstGeom>
+          <a:ln>
+            <a:noFill/>
+          </a:ln>
+        </p:spPr>
+        <p:style>
+          <a:lnRef idx="2">
+            <a:schemeClr val="accent1">
+              <a:shade val="50000"/>
+            </a:schemeClr>
+          </a:lnRef>
+          <a:fillRef idx="1">
+            <a:schemeClr val="accent1"/>
+          </a:fillRef>
+          <a:effectRef idx="0">
+            <a:schemeClr val="accent1"/>
+          </a:effectRef>
+          <a:fontRef idx="minor">
+            <a:schemeClr val="lt1"/>
+          </a:fontRef>
+        </p:style>
+        <p:txBody>
+          <a:bodyPr rtlCol="0" anchor="ctr"/>
+          <a:lstStyle/>
+          <a:p>
+            <a:pPr algn="ctr"/>
+            <a:endParaRPr lang="en-US"/>
+          </a:p>
+        </p:txBody>
+      </p:sp>
+      <p:sp>
+        <p:nvSpPr>
+          <p:cNvPr id="2" name="Title 1">
+            <a:extLst>
+              <a:ext uri="{FF2B5EF4-FFF2-40B4-BE49-F238E27FC236}">
+                <a16:creationId xmlns:a16="http://schemas.microsoft.com/office/drawing/2014/main" id="{FF24D30D-5738-4D77-BECA-4E7FF661559C}"/>
+              </a:ext>
+            </a:extLst>
+          </p:cNvPr>
+          <p:cNvSpPr>
+            <a:spLocks noGrp="1"/>
+          </p:cNvSpPr>
+          <p:nvPr>
+            <p:ph type="title"/>
+          </p:nvPr>
+        </p:nvSpPr>
+        <p:spPr>
+          <a:xfrm>
+            <a:off x="707900" y="643467"/>
+            <a:ext cx="3946393" cy="1956298"/>
+          </a:xfrm>
+        </p:spPr>
+        <p:txBody>
+          <a:bodyPr>
+            <a:normAutofit/>
+          </a:bodyPr>
+          <a:lstStyle/>
+          <a:p>
+            <a:pPr algn="l"/>
+            <a:endParaRPr lang="en-GB" sz="3600"/>
+          </a:p>
+        </p:txBody>
+      </p:sp>
+      <p:sp>
+        <p:nvSpPr>
+          <p:cNvPr id="3" name="Content Placeholder 2">
+            <a:extLst>
+              <a:ext uri="{FF2B5EF4-FFF2-40B4-BE49-F238E27FC236}">
+                <a16:creationId xmlns:a16="http://schemas.microsoft.com/office/drawing/2014/main" id="{93101418-93BD-40D9-A3CF-0A2B2EBEFBD1}"/>
+              </a:ext>
+            </a:extLst>
+          </p:cNvPr>
+          <p:cNvSpPr>
+            <a:spLocks noGrp="1"/>
+          </p:cNvSpPr>
+          <p:nvPr>
+            <p:ph idx="1"/>
+          </p:nvPr>
+        </p:nvSpPr>
+        <p:spPr>
+          <a:xfrm>
+            <a:off x="5139768" y="643467"/>
+            <a:ext cx="6430560" cy="1956298"/>
+          </a:xfrm>
+        </p:spPr>
+        <p:txBody>
+          <a:bodyPr anchor="ctr">
+            <a:normAutofit/>
+          </a:bodyPr>
+          <a:lstStyle/>
+          <a:p>
+            <a:endParaRPr lang="en-GB"/>
+          </a:p>
+        </p:txBody>
+      </p:sp>
+      <p:pic>
+        <p:nvPicPr>
+          <p:cNvPr id="5" name="slide3" descr="Distribution of days available in a month over time">
+            <a:extLst>
+              <a:ext uri="{FF2B5EF4-FFF2-40B4-BE49-F238E27FC236}">
+                <a16:creationId xmlns:a16="http://schemas.microsoft.com/office/drawing/2014/main" id="{5111680A-0A7C-42A4-A83C-92FADD6530BC}"/>
+              </a:ext>
+            </a:extLst>
+          </p:cNvPr>
+          <p:cNvPicPr>
+            <a:picLocks noChangeAspect="1"/>
+          </p:cNvPicPr>
+          <p:nvPr/>
+        </p:nvPicPr>
+        <p:blipFill rotWithShape="1">
+          <a:blip r:embed="rId3">
+            <a:extLst>
+              <a:ext uri="{28A0092B-C50C-407E-A947-70E740481C1C}">
+                <a14:useLocalDpi xmlns:a14="http://schemas.microsoft.com/office/drawing/2010/main" val="0"/>
+              </a:ext>
+            </a:extLst>
+          </a:blip>
+          <a:srcRect t="7113"/>
+          <a:stretch/>
+        </p:blipFill>
+        <p:spPr>
+          <a:xfrm>
+            <a:off x="5263593" y="2943131"/>
+            <a:ext cx="5894418" cy="3271402"/>
+          </a:xfrm>
+          <a:prstGeom prst="rect">
+            <a:avLst/>
+          </a:prstGeom>
+        </p:spPr>
+      </p:pic>
+      <p:cxnSp>
+        <p:nvCxnSpPr>
+          <p:cNvPr id="19" name="Straight Connector 18">
+            <a:extLst>
+              <a:ext uri="{FF2B5EF4-FFF2-40B4-BE49-F238E27FC236}">
+                <a16:creationId xmlns:a16="http://schemas.microsoft.com/office/drawing/2014/main" id="{950C7260-B0EA-4B69-927F-A414658E9F1E}"/>
+              </a:ext>
+              <a:ext uri="{C183D7F6-B498-43B3-948B-1728B52AA6E4}">
+                <adec:decorative xmlns:adec="http://schemas.microsoft.com/office/drawing/2017/decorative" val="1"/>
+              </a:ext>
+            </a:extLst>
+          </p:cNvPr>
+          <p:cNvCxnSpPr>
+            <a:cxnSpLocks noGrp="1" noRot="1" noChangeAspect="1" noMove="1" noResize="1" noEditPoints="1" noAdjustHandles="1" noChangeArrowheads="1" noChangeShapeType="1"/>
+          </p:cNvCxnSpPr>
+          <p:nvPr>
+            <p:extLst>
+              <p:ext uri="{386F3935-93C4-4BCD-93E2-E3B085C9AB24}">
+                <p16:designElem xmlns:p16="http://schemas.microsoft.com/office/powerpoint/2015/main" val="1"/>
+              </p:ext>
+            </p:extLst>
+          </p:nvPr>
+        </p:nvCxnSpPr>
+        <p:spPr>
+          <a:xfrm>
+            <a:off x="4912659" y="3820460"/>
+            <a:ext cx="0" cy="1371600"/>
+          </a:xfrm>
+          <a:prstGeom prst="line">
+            <a:avLst/>
+          </a:prstGeom>
+          <a:ln w="19050">
+            <a:solidFill>
+              <a:schemeClr val="tx1">
+                <a:lumMod val="75000"/>
+              </a:schemeClr>
+            </a:solidFill>
+          </a:ln>
+          <a:effectLst>
+            <a:innerShdw blurRad="114300">
+              <a:prstClr val="black"/>
+            </a:innerShdw>
+          </a:effectLst>
+        </p:spPr>
+        <p:style>
+          <a:lnRef idx="1">
+            <a:schemeClr val="accent1"/>
+          </a:lnRef>
+          <a:fillRef idx="0">
+            <a:schemeClr val="accent1"/>
+          </a:fillRef>
+          <a:effectRef idx="0">
+            <a:schemeClr val="accent1"/>
+          </a:effectRef>
+          <a:fontRef idx="minor">
+            <a:schemeClr val="tx1"/>
+          </a:fontRef>
+        </p:style>
+      </p:cxnSp>
+      <p:pic>
+        <p:nvPicPr>
+          <p:cNvPr id="4" name="slide2" descr="Overall distribution of days avail in a month">
+            <a:extLst>
+              <a:ext uri="{FF2B5EF4-FFF2-40B4-BE49-F238E27FC236}">
+                <a16:creationId xmlns:a16="http://schemas.microsoft.com/office/drawing/2014/main" id="{71091D09-D188-4D9D-8113-D1C42CE70A55}"/>
+              </a:ext>
+            </a:extLst>
+          </p:cNvPr>
+          <p:cNvPicPr>
+            <a:picLocks noChangeAspect="1"/>
+          </p:cNvPicPr>
+          <p:nvPr/>
+        </p:nvPicPr>
+        <p:blipFill rotWithShape="1">
+          <a:blip r:embed="rId4">
+            <a:extLst>
+              <a:ext uri="{28A0092B-C50C-407E-A947-70E740481C1C}">
+                <a14:useLocalDpi xmlns:a14="http://schemas.microsoft.com/office/drawing/2010/main" val="0"/>
+              </a:ext>
+            </a:extLst>
+          </a:blip>
+          <a:srcRect t="5063"/>
+          <a:stretch/>
+        </p:blipFill>
+        <p:spPr>
+          <a:xfrm>
+            <a:off x="877296" y="3443975"/>
+            <a:ext cx="3776997" cy="2124569"/>
+          </a:xfrm>
+          <a:prstGeom prst="rect">
+            <a:avLst/>
+          </a:prstGeom>
+        </p:spPr>
+      </p:pic>
+    </p:spTree>
+    <p:extLst>
+      <p:ext uri="{BB962C8B-B14F-4D97-AF65-F5344CB8AC3E}">
+        <p14:creationId xmlns:p14="http://schemas.microsoft.com/office/powerpoint/2010/main" val="1034213999"/>
+      </p:ext>
+    </p:extLst>
+  </p:cSld>
+  <p:clrMapOvr>
+    <a:masterClrMapping/>
   </p:clrMapOvr>
 </p:sld>
 </file>

</xml_diff>